<commit_message>
update some changes on the Database_schema_formal.pptx
</commit_message>
<xml_diff>
--- a/documentation/Database_schema_formal.pptx
+++ b/documentation/Database_schema_formal.pptx
@@ -3104,7 +3104,7 @@
           <p:nvPr>
             <p:extLst>
               <p:ext uri="{D42A27DB-BD31-4B8C-83A1-F6EECF244321}">
-                <p14:modId xmlns:p14="http://schemas.microsoft.com/office/powerpoint/2010/main" val="2592645722"/>
+                <p14:modId xmlns:p14="http://schemas.microsoft.com/office/powerpoint/2010/main" val="2053743438"/>
               </p:ext>
             </p:extLst>
           </p:nvPr>
@@ -3133,10 +3133,10 @@
                     <a:lstStyle/>
                     <a:p>
                       <a:r>
-                        <a:rPr lang="en-US" sz="1200" dirty="0" err="1" smtClean="0"/>
+                        <a:rPr lang="en-US" sz="1200" u="sng" dirty="0" smtClean="0"/>
                         <a:t>pssn</a:t>
                       </a:r>
-                      <a:endParaRPr lang="en-US" sz="1200" dirty="0"/>
+                      <a:endParaRPr lang="en-US" sz="1200" u="sng" dirty="0"/>
                     </a:p>
                   </a:txBody>
                   <a:tcPr/>
@@ -3175,7 +3175,7 @@
                     <a:lstStyle/>
                     <a:p>
                       <a:r>
-                        <a:rPr lang="en-US" sz="1200" dirty="0" err="1" smtClean="0"/>
+                        <a:rPr lang="en-US" sz="1200" dirty="0" smtClean="0"/>
                         <a:t>essn</a:t>
                       </a:r>
                       <a:endParaRPr lang="en-US" sz="1200" dirty="0"/>
@@ -3189,7 +3189,7 @@
                     <a:lstStyle/>
                     <a:p>
                       <a:r>
-                        <a:rPr lang="en-US" sz="1200" dirty="0" err="1" smtClean="0"/>
+                        <a:rPr lang="en-US" sz="1200" smtClean="0"/>
                         <a:t>Floor_Nurse_essn</a:t>
                       </a:r>
                       <a:endParaRPr lang="en-US" sz="1200" dirty="0"/>
@@ -3211,7 +3211,7 @@
           <p:nvPr>
             <p:extLst>
               <p:ext uri="{D42A27DB-BD31-4B8C-83A1-F6EECF244321}">
-                <p14:modId xmlns:p14="http://schemas.microsoft.com/office/powerpoint/2010/main" val="1693267474"/>
+                <p14:modId xmlns:p14="http://schemas.microsoft.com/office/powerpoint/2010/main" val="2515189178"/>
               </p:ext>
             </p:extLst>
           </p:nvPr>
@@ -3240,10 +3240,10 @@
                     <a:lstStyle/>
                     <a:p>
                       <a:r>
-                        <a:rPr lang="en-US" sz="1200" dirty="0" err="1" smtClean="0"/>
+                        <a:rPr lang="en-US" sz="1200" u="sng" dirty="0" smtClean="0"/>
                         <a:t>essn</a:t>
                       </a:r>
-                      <a:endParaRPr lang="en-US" sz="1200" dirty="0"/>
+                      <a:endParaRPr lang="en-US" sz="1200" u="sng" dirty="0"/>
                     </a:p>
                   </a:txBody>
                   <a:tcPr/>
@@ -3318,7 +3318,7 @@
           <p:nvPr>
             <p:extLst>
               <p:ext uri="{D42A27DB-BD31-4B8C-83A1-F6EECF244321}">
-                <p14:modId xmlns:p14="http://schemas.microsoft.com/office/powerpoint/2010/main" val="2456534610"/>
+                <p14:modId xmlns:p14="http://schemas.microsoft.com/office/powerpoint/2010/main" val="3163494015"/>
               </p:ext>
             </p:extLst>
           </p:nvPr>
@@ -3348,10 +3348,10 @@
                     <a:lstStyle/>
                     <a:p>
                       <a:r>
-                        <a:rPr lang="en-US" sz="1200" dirty="0" err="1" smtClean="0"/>
+                        <a:rPr lang="en-US" sz="1200" u="sng" dirty="0" smtClean="0"/>
                         <a:t>Vital_id</a:t>
                       </a:r>
-                      <a:endParaRPr lang="en-US" sz="1200" dirty="0"/>
+                      <a:endParaRPr lang="en-US" sz="1200" u="sng" dirty="0"/>
                     </a:p>
                   </a:txBody>
                   <a:tcPr/>
@@ -3362,7 +3362,7 @@
                     <a:lstStyle/>
                     <a:p>
                       <a:r>
-                        <a:rPr lang="en-US" sz="1200" dirty="0" err="1" smtClean="0"/>
+                        <a:rPr lang="en-US" sz="1200" dirty="0" smtClean="0"/>
                         <a:t>Vital_name</a:t>
                       </a:r>
                       <a:endParaRPr lang="en-US" sz="1200" dirty="0"/>
@@ -3376,7 +3376,7 @@
                     <a:lstStyle/>
                     <a:p>
                       <a:r>
-                        <a:rPr lang="en-US" sz="1200" dirty="0" err="1" smtClean="0"/>
+                        <a:rPr lang="en-US" sz="1200" dirty="0" smtClean="0"/>
                         <a:t>pssn</a:t>
                       </a:r>
                       <a:endParaRPr lang="en-US" sz="1200" dirty="0"/>
@@ -3390,7 +3390,7 @@
                     <a:lstStyle/>
                     <a:p>
                       <a:r>
-                        <a:rPr lang="en-US" sz="1200" dirty="0" err="1" smtClean="0"/>
+                        <a:rPr lang="en-US" sz="1200" dirty="0" smtClean="0"/>
                         <a:t>essn</a:t>
                       </a:r>
                       <a:endParaRPr lang="en-US" sz="1200" dirty="0"/>
@@ -3404,7 +3404,7 @@
                     <a:lstStyle/>
                     <a:p>
                       <a:r>
-                        <a:rPr lang="en-US" sz="1200" dirty="0" err="1" smtClean="0"/>
+                        <a:rPr lang="en-US" sz="1200" dirty="0" smtClean="0"/>
                         <a:t>Date_stamp</a:t>
                       </a:r>
                       <a:endParaRPr lang="en-US" sz="1200" dirty="0"/>
@@ -3418,7 +3418,7 @@
                     <a:lstStyle/>
                     <a:p>
                       <a:r>
-                        <a:rPr lang="en-US" sz="1200" dirty="0" err="1" smtClean="0"/>
+                        <a:rPr lang="en-US" sz="1200" dirty="0" smtClean="0"/>
                         <a:t>Time_stamp</a:t>
                       </a:r>
                       <a:endParaRPr lang="en-US" sz="1200" dirty="0"/>
@@ -3514,7 +3514,7 @@
           <a:lstStyle/>
           <a:p>
             <a:r>
-              <a:rPr lang="en-US" sz="1200" b="1" dirty="0" err="1" smtClean="0"/>
+              <a:rPr lang="en-US" sz="1200" b="1" dirty="0" smtClean="0"/>
               <a:t>Vital_Data_Point</a:t>
             </a:r>
             <a:endParaRPr lang="en-US" sz="1200" b="1" dirty="0"/>
@@ -3530,7 +3530,7 @@
           <p:nvPr>
             <p:extLst>
               <p:ext uri="{D42A27DB-BD31-4B8C-83A1-F6EECF244321}">
-                <p14:modId xmlns:p14="http://schemas.microsoft.com/office/powerpoint/2010/main" val="3413029285"/>
+                <p14:modId xmlns:p14="http://schemas.microsoft.com/office/powerpoint/2010/main" val="2935802805"/>
               </p:ext>
             </p:extLst>
           </p:nvPr>
@@ -3556,10 +3556,10 @@
                     <a:lstStyle/>
                     <a:p>
                       <a:r>
-                        <a:rPr lang="en-US" sz="1200" dirty="0" err="1" smtClean="0"/>
+                        <a:rPr lang="en-US" sz="1200" u="sng" dirty="0" smtClean="0"/>
                         <a:t>Vital_id</a:t>
                       </a:r>
-                      <a:endParaRPr lang="en-US" sz="1200" dirty="0"/>
+                      <a:endParaRPr lang="en-US" sz="1200" u="sng" dirty="0"/>
                     </a:p>
                   </a:txBody>
                   <a:tcPr/>
@@ -3587,10 +3587,9 @@
                         <a:defRPr/>
                       </a:pPr>
                       <a:r>
-                        <a:rPr lang="en-US" sz="1200" dirty="0" err="1" smtClean="0"/>
+                        <a:rPr lang="en-US" sz="1200" dirty="0" smtClean="0"/>
                         <a:t>Beast_per_minute</a:t>
                       </a:r>
-                      <a:endParaRPr lang="en-US" sz="1200" dirty="0" smtClean="0"/>
                     </a:p>
                   </a:txBody>
                   <a:tcPr/>
@@ -3609,7 +3608,7 @@
           <p:nvPr>
             <p:extLst>
               <p:ext uri="{D42A27DB-BD31-4B8C-83A1-F6EECF244321}">
-                <p14:modId xmlns:p14="http://schemas.microsoft.com/office/powerpoint/2010/main" val="3812707519"/>
+                <p14:modId xmlns:p14="http://schemas.microsoft.com/office/powerpoint/2010/main" val="3156333866"/>
               </p:ext>
             </p:extLst>
           </p:nvPr>
@@ -3635,10 +3634,10 @@
                     <a:lstStyle/>
                     <a:p>
                       <a:r>
-                        <a:rPr lang="en-US" sz="1200" dirty="0" err="1" smtClean="0"/>
+                        <a:rPr lang="en-US" sz="1200" u="sng" dirty="0" smtClean="0"/>
                         <a:t>Vital_id</a:t>
                       </a:r>
-                      <a:endParaRPr lang="en-US" sz="1200" dirty="0"/>
+                      <a:endParaRPr lang="en-US" sz="1200" u="sng" dirty="0"/>
                     </a:p>
                   </a:txBody>
                   <a:tcPr/>
@@ -3671,7 +3670,7 @@
           <p:nvPr>
             <p:extLst>
               <p:ext uri="{D42A27DB-BD31-4B8C-83A1-F6EECF244321}">
-                <p14:modId xmlns:p14="http://schemas.microsoft.com/office/powerpoint/2010/main" val="2915563121"/>
+                <p14:modId xmlns:p14="http://schemas.microsoft.com/office/powerpoint/2010/main" val="3886358958"/>
               </p:ext>
             </p:extLst>
           </p:nvPr>
@@ -3697,10 +3696,10 @@
                     <a:lstStyle/>
                     <a:p>
                       <a:r>
-                        <a:rPr lang="en-US" sz="1200" dirty="0" err="1" smtClean="0"/>
+                        <a:rPr lang="en-US" sz="1200" u="sng" dirty="0" smtClean="0"/>
                         <a:t>Vital_id</a:t>
                       </a:r>
-                      <a:endParaRPr lang="en-US" sz="1200" dirty="0"/>
+                      <a:endParaRPr lang="en-US" sz="1200" u="sng" dirty="0"/>
                     </a:p>
                   </a:txBody>
                   <a:tcPr/>
@@ -3711,7 +3710,7 @@
                     <a:lstStyle/>
                     <a:p>
                       <a:r>
-                        <a:rPr lang="en-US" sz="1200" dirty="0" err="1" smtClean="0"/>
+                        <a:rPr lang="en-US" sz="1200" dirty="0" smtClean="0"/>
                         <a:t>Percentage_level</a:t>
                       </a:r>
                       <a:endParaRPr lang="en-US" sz="1200" dirty="0"/>
@@ -3733,7 +3732,7 @@
           <p:nvPr>
             <p:extLst>
               <p:ext uri="{D42A27DB-BD31-4B8C-83A1-F6EECF244321}">
-                <p14:modId xmlns:p14="http://schemas.microsoft.com/office/powerpoint/2010/main" val="2170479678"/>
+                <p14:modId xmlns:p14="http://schemas.microsoft.com/office/powerpoint/2010/main" val="355721794"/>
               </p:ext>
             </p:extLst>
           </p:nvPr>
@@ -3760,10 +3759,10 @@
                     <a:lstStyle/>
                     <a:p>
                       <a:r>
-                        <a:rPr lang="en-US" sz="1200" dirty="0" err="1" smtClean="0"/>
+                        <a:rPr lang="en-US" sz="1200" u="sng" dirty="0" smtClean="0"/>
                         <a:t>Vital_id</a:t>
                       </a:r>
-                      <a:endParaRPr lang="en-US" sz="1200" dirty="0"/>
+                      <a:endParaRPr lang="en-US" sz="1200" u="sng" dirty="0"/>
                     </a:p>
                   </a:txBody>
                   <a:tcPr/>
@@ -3854,7 +3853,7 @@
           <a:lstStyle/>
           <a:p>
             <a:r>
-              <a:rPr lang="en-US" sz="1200" b="1" dirty="0" err="1" smtClean="0"/>
+              <a:rPr lang="en-US" sz="1200" b="1" dirty="0" smtClean="0"/>
               <a:t>Hert_Rate</a:t>
             </a:r>
             <a:endParaRPr lang="en-US" sz="1200" b="1" dirty="0"/>
@@ -3914,7 +3913,7 @@
           <a:lstStyle/>
           <a:p>
             <a:r>
-              <a:rPr lang="en-US" sz="1200" b="1" dirty="0" err="1" smtClean="0"/>
+              <a:rPr lang="en-US" sz="1200" b="1" dirty="0" smtClean="0"/>
               <a:t>Blood_Pressure</a:t>
             </a:r>
             <a:endParaRPr lang="en-US" sz="1200" b="1" dirty="0"/>
@@ -4650,6 +4649,13 @@
   <p:clrMapOvr>
     <a:masterClrMapping/>
   </p:clrMapOvr>
+  <p:timing>
+    <p:tnLst>
+      <p:par>
+        <p:cTn id="1" dur="indefinite" restart="never" nodeType="tmRoot"/>
+      </p:par>
+    </p:tnLst>
+  </p:timing>
 </p:sld>
 </file>
 

</xml_diff>

<commit_message>
update some changes on documentation/Database_schema_formal.pptx
</commit_message>
<xml_diff>
--- a/documentation/Database_schema_formal.pptx
+++ b/documentation/Database_schema_formal.pptx
@@ -3104,14 +3104,14 @@
           <p:nvPr>
             <p:extLst>
               <p:ext uri="{D42A27DB-BD31-4B8C-83A1-F6EECF244321}">
-                <p14:modId xmlns:p14="http://schemas.microsoft.com/office/powerpoint/2010/main" val="2053743438"/>
+                <p14:modId xmlns:p14="http://schemas.microsoft.com/office/powerpoint/2010/main" val="213071562"/>
               </p:ext>
             </p:extLst>
           </p:nvPr>
         </p:nvGraphicFramePr>
         <p:xfrm>
           <a:off x="1116300" y="1510099"/>
-          <a:ext cx="5016862" cy="274320"/>
+          <a:ext cx="2612571" cy="274320"/>
         </p:xfrm>
         <a:graphic>
           <a:graphicData uri="http://schemas.openxmlformats.org/drawingml/2006/table">
@@ -3123,8 +3123,6 @@
                 <a:gridCol w="870857"/>
                 <a:gridCol w="870857"/>
                 <a:gridCol w="870857"/>
-                <a:gridCol w="870857"/>
-                <a:gridCol w="1533434"/>
               </a:tblGrid>
               <a:tr h="274320">
                 <a:tc>
@@ -3169,34 +3167,6 @@
                   </a:txBody>
                   <a:tcPr/>
                 </a:tc>
-                <a:tc>
-                  <a:txBody>
-                    <a:bodyPr/>
-                    <a:lstStyle/>
-                    <a:p>
-                      <a:r>
-                        <a:rPr lang="en-US" sz="1200" dirty="0" smtClean="0"/>
-                        <a:t>essn</a:t>
-                      </a:r>
-                      <a:endParaRPr lang="en-US" sz="1200" dirty="0"/>
-                    </a:p>
-                  </a:txBody>
-                  <a:tcPr/>
-                </a:tc>
-                <a:tc>
-                  <a:txBody>
-                    <a:bodyPr/>
-                    <a:lstStyle/>
-                    <a:p>
-                      <a:r>
-                        <a:rPr lang="en-US" sz="1200" smtClean="0"/>
-                        <a:t>Floor_Nurse_essn</a:t>
-                      </a:r>
-                      <a:endParaRPr lang="en-US" sz="1200" dirty="0"/>
-                    </a:p>
-                  </a:txBody>
-                  <a:tcPr/>
-                </a:tc>
               </a:tr>
             </a:tbl>
           </a:graphicData>
@@ -3211,7 +3181,7 @@
           <p:nvPr>
             <p:extLst>
               <p:ext uri="{D42A27DB-BD31-4B8C-83A1-F6EECF244321}">
-                <p14:modId xmlns:p14="http://schemas.microsoft.com/office/powerpoint/2010/main" val="2515189178"/>
+                <p14:modId xmlns:p14="http://schemas.microsoft.com/office/powerpoint/2010/main" val="628902439"/>
               </p:ext>
             </p:extLst>
           </p:nvPr>
@@ -3530,7 +3500,7 @@
           <p:nvPr>
             <p:extLst>
               <p:ext uri="{D42A27DB-BD31-4B8C-83A1-F6EECF244321}">
-                <p14:modId xmlns:p14="http://schemas.microsoft.com/office/powerpoint/2010/main" val="2935802805"/>
+                <p14:modId xmlns:p14="http://schemas.microsoft.com/office/powerpoint/2010/main" val="1543741531"/>
               </p:ext>
             </p:extLst>
           </p:nvPr>
@@ -3587,9 +3557,10 @@
                         <a:defRPr/>
                       </a:pPr>
                       <a:r>
-                        <a:rPr lang="en-US" sz="1200" dirty="0" smtClean="0"/>
-                        <a:t>Beast_per_minute</a:t>
+                        <a:rPr lang="en-US" sz="1200" dirty="0" err="1" smtClean="0"/>
+                        <a:t>Beats_per_minute</a:t>
                       </a:r>
+                      <a:endParaRPr lang="en-US" sz="1200" dirty="0" smtClean="0"/>
                     </a:p>
                   </a:txBody>
                   <a:tcPr/>
@@ -3854,7 +3825,7 @@
           <a:p>
             <a:r>
               <a:rPr lang="en-US" sz="1200" b="1" dirty="0" smtClean="0"/>
-              <a:t>Hert_Rate</a:t>
+              <a:t>Heart_Rate</a:t>
             </a:r>
             <a:endParaRPr lang="en-US" sz="1200" b="1" dirty="0"/>
           </a:p>
@@ -4392,66 +4363,6 @@
       </p:cxnSp>
       <p:cxnSp>
         <p:nvCxnSpPr>
-          <p:cNvPr id="193" name="Straight Connector 192"/>
-          <p:cNvCxnSpPr/>
-          <p:nvPr/>
-        </p:nvCxnSpPr>
-        <p:spPr>
-          <a:xfrm flipV="1">
-            <a:off x="5239275" y="1143000"/>
-            <a:ext cx="0" cy="367100"/>
-          </a:xfrm>
-          <a:prstGeom prst="line">
-            <a:avLst/>
-          </a:prstGeom>
-        </p:spPr>
-        <p:style>
-          <a:lnRef idx="1">
-            <a:schemeClr val="accent1"/>
-          </a:lnRef>
-          <a:fillRef idx="0">
-            <a:schemeClr val="accent1"/>
-          </a:fillRef>
-          <a:effectRef idx="0">
-            <a:schemeClr val="accent1"/>
-          </a:effectRef>
-          <a:fontRef idx="minor">
-            <a:schemeClr val="tx1"/>
-          </a:fontRef>
-        </p:style>
-      </p:cxnSp>
-      <p:cxnSp>
-        <p:nvCxnSpPr>
-          <p:cNvPr id="202" name="Straight Connector 201"/>
-          <p:cNvCxnSpPr/>
-          <p:nvPr/>
-        </p:nvCxnSpPr>
-        <p:spPr>
-          <a:xfrm flipV="1">
-            <a:off x="4191000" y="1233100"/>
-            <a:ext cx="0" cy="277001"/>
-          </a:xfrm>
-          <a:prstGeom prst="line">
-            <a:avLst/>
-          </a:prstGeom>
-        </p:spPr>
-        <p:style>
-          <a:lnRef idx="1">
-            <a:schemeClr val="accent1"/>
-          </a:lnRef>
-          <a:fillRef idx="0">
-            <a:schemeClr val="accent1"/>
-          </a:fillRef>
-          <a:effectRef idx="0">
-            <a:schemeClr val="accent1"/>
-          </a:effectRef>
-          <a:fontRef idx="minor">
-            <a:schemeClr val="tx1"/>
-          </a:fontRef>
-        </p:style>
-      </p:cxnSp>
-      <p:cxnSp>
-        <p:nvCxnSpPr>
           <p:cNvPr id="216" name="Straight Connector 215"/>
           <p:cNvCxnSpPr/>
           <p:nvPr/>
@@ -4513,16 +4424,93 @@
           </a:fontRef>
         </p:style>
       </p:cxnSp>
+      <p:graphicFrame>
+        <p:nvGraphicFramePr>
+          <p:cNvPr id="241" name="Table 240"/>
+          <p:cNvGraphicFramePr>
+            <a:graphicFrameLocks noGrp="1"/>
+          </p:cNvGraphicFramePr>
+          <p:nvPr>
+            <p:extLst>
+              <p:ext uri="{D42A27DB-BD31-4B8C-83A1-F6EECF244321}">
+                <p14:modId xmlns:p14="http://schemas.microsoft.com/office/powerpoint/2010/main" val="3710937916"/>
+              </p:ext>
+            </p:extLst>
+          </p:nvPr>
+        </p:nvGraphicFramePr>
+        <p:xfrm>
+          <a:off x="4191000" y="1510099"/>
+          <a:ext cx="2612571" cy="274320"/>
+        </p:xfrm>
+        <a:graphic>
+          <a:graphicData uri="http://schemas.openxmlformats.org/drawingml/2006/table">
+            <a:tbl>
+              <a:tblPr firstRow="1" bandRow="1">
+                <a:tableStyleId>{5940675A-B579-460E-94D1-54222C63F5DA}</a:tableStyleId>
+              </a:tblPr>
+              <a:tblGrid>
+                <a:gridCol w="609600"/>
+                <a:gridCol w="609600"/>
+                <a:gridCol w="1393371"/>
+              </a:tblGrid>
+              <a:tr h="274320">
+                <a:tc>
+                  <a:txBody>
+                    <a:bodyPr/>
+                    <a:lstStyle/>
+                    <a:p>
+                      <a:r>
+                        <a:rPr lang="en-US" sz="1200" u="sng" dirty="0" smtClean="0"/>
+                        <a:t>pssn</a:t>
+                      </a:r>
+                      <a:endParaRPr lang="en-US" sz="1200" u="sng" dirty="0"/>
+                    </a:p>
+                  </a:txBody>
+                  <a:tcPr/>
+                </a:tc>
+                <a:tc>
+                  <a:txBody>
+                    <a:bodyPr/>
+                    <a:lstStyle/>
+                    <a:p>
+                      <a:r>
+                        <a:rPr lang="en-US" sz="1200" u="sng" dirty="0" smtClean="0"/>
+                        <a:t>essn</a:t>
+                      </a:r>
+                      <a:endParaRPr lang="en-US" sz="1200" u="sng" dirty="0"/>
+                    </a:p>
+                  </a:txBody>
+                  <a:tcPr/>
+                </a:tc>
+                <a:tc>
+                  <a:txBody>
+                    <a:bodyPr/>
+                    <a:lstStyle/>
+                    <a:p>
+                      <a:r>
+                        <a:rPr lang="en-US" sz="1200" u="sng" dirty="0" smtClean="0"/>
+                        <a:t>Floor_Nurse_essn</a:t>
+                      </a:r>
+                      <a:endParaRPr lang="en-US" sz="1200" u="sng" dirty="0"/>
+                    </a:p>
+                  </a:txBody>
+                  <a:tcPr/>
+                </a:tc>
+              </a:tr>
+            </a:tbl>
+          </a:graphicData>
+        </a:graphic>
+      </p:graphicFrame>
       <p:cxnSp>
         <p:nvCxnSpPr>
-          <p:cNvPr id="223" name="Straight Connector 222"/>
+          <p:cNvPr id="243" name="Straight Connector 242"/>
           <p:cNvCxnSpPr/>
           <p:nvPr/>
         </p:nvCxnSpPr>
         <p:spPr>
-          <a:xfrm flipH="1">
-            <a:off x="1905000" y="1143000"/>
-            <a:ext cx="3334275" cy="0"/>
+          <a:xfrm>
+            <a:off x="4457700" y="1752600"/>
+            <a:ext cx="0" cy="188851"/>
           </a:xfrm>
           <a:prstGeom prst="line">
             <a:avLst/>
@@ -4545,21 +4533,18 @@
       </p:cxnSp>
       <p:cxnSp>
         <p:nvCxnSpPr>
-          <p:cNvPr id="226" name="Straight Arrow Connector 225"/>
+          <p:cNvPr id="246" name="Straight Connector 245"/>
           <p:cNvCxnSpPr/>
           <p:nvPr/>
         </p:nvCxnSpPr>
         <p:spPr>
-          <a:xfrm flipV="1">
-            <a:off x="1905000" y="990600"/>
-            <a:ext cx="0" cy="152400"/>
-          </a:xfrm>
-          <a:prstGeom prst="straightConnector1">
+          <a:xfrm flipH="1">
+            <a:off x="1645950" y="1941451"/>
+            <a:ext cx="2811750" cy="0"/>
+          </a:xfrm>
+          <a:prstGeom prst="line">
             <a:avLst/>
           </a:prstGeom>
-          <a:ln>
-            <a:tailEnd type="arrow"/>
-          </a:ln>
         </p:spPr>
         <p:style>
           <a:lnRef idx="1">
@@ -4578,18 +4563,21 @@
       </p:cxnSp>
       <p:cxnSp>
         <p:nvCxnSpPr>
-          <p:cNvPr id="230" name="Straight Connector 229"/>
+          <p:cNvPr id="249" name="Straight Arrow Connector 248"/>
           <p:cNvCxnSpPr/>
           <p:nvPr/>
         </p:nvCxnSpPr>
         <p:spPr>
-          <a:xfrm flipH="1">
-            <a:off x="1752600" y="1233100"/>
-            <a:ext cx="2438400" cy="0"/>
-          </a:xfrm>
-          <a:prstGeom prst="line">
+          <a:xfrm flipV="1">
+            <a:off x="1645950" y="1752600"/>
+            <a:ext cx="0" cy="188851"/>
+          </a:xfrm>
+          <a:prstGeom prst="straightConnector1">
             <a:avLst/>
           </a:prstGeom>
+          <a:ln>
+            <a:tailEnd type="arrow"/>
+          </a:ln>
         </p:spPr>
         <p:style>
           <a:lnRef idx="1">
@@ -4608,14 +4596,167 @@
       </p:cxnSp>
       <p:cxnSp>
         <p:nvCxnSpPr>
-          <p:cNvPr id="237" name="Straight Arrow Connector 236"/>
+          <p:cNvPr id="253" name="Straight Connector 252"/>
           <p:cNvCxnSpPr/>
           <p:nvPr/>
         </p:nvCxnSpPr>
         <p:spPr>
           <a:xfrm flipV="1">
-            <a:off x="1752600" y="990600"/>
+            <a:off x="5029200" y="1233100"/>
+            <a:ext cx="0" cy="277000"/>
+          </a:xfrm>
+          <a:prstGeom prst="line">
+            <a:avLst/>
+          </a:prstGeom>
+        </p:spPr>
+        <p:style>
+          <a:lnRef idx="1">
+            <a:schemeClr val="accent1"/>
+          </a:lnRef>
+          <a:fillRef idx="0">
+            <a:schemeClr val="accent1"/>
+          </a:fillRef>
+          <a:effectRef idx="0">
+            <a:schemeClr val="accent1"/>
+          </a:effectRef>
+          <a:fontRef idx="minor">
+            <a:schemeClr val="tx1"/>
+          </a:fontRef>
+        </p:style>
+      </p:cxnSp>
+      <p:cxnSp>
+        <p:nvCxnSpPr>
+          <p:cNvPr id="258" name="Straight Connector 257"/>
+          <p:cNvCxnSpPr/>
+          <p:nvPr/>
+        </p:nvCxnSpPr>
+        <p:spPr>
+          <a:xfrm flipH="1">
+            <a:off x="1371600" y="1233100"/>
+            <a:ext cx="3657600" cy="0"/>
+          </a:xfrm>
+          <a:prstGeom prst="line">
+            <a:avLst/>
+          </a:prstGeom>
+        </p:spPr>
+        <p:style>
+          <a:lnRef idx="1">
+            <a:schemeClr val="accent1"/>
+          </a:lnRef>
+          <a:fillRef idx="0">
+            <a:schemeClr val="accent1"/>
+          </a:fillRef>
+          <a:effectRef idx="0">
+            <a:schemeClr val="accent1"/>
+          </a:effectRef>
+          <a:fontRef idx="minor">
+            <a:schemeClr val="tx1"/>
+          </a:fontRef>
+        </p:style>
+      </p:cxnSp>
+      <p:cxnSp>
+        <p:nvCxnSpPr>
+          <p:cNvPr id="263" name="Straight Arrow Connector 262"/>
+          <p:cNvCxnSpPr/>
+          <p:nvPr/>
+        </p:nvCxnSpPr>
+        <p:spPr>
+          <a:xfrm flipV="1">
+            <a:off x="1371600" y="990600"/>
             <a:ext cx="0" cy="242500"/>
+          </a:xfrm>
+          <a:prstGeom prst="straightConnector1">
+            <a:avLst/>
+          </a:prstGeom>
+          <a:ln>
+            <a:tailEnd type="arrow"/>
+          </a:ln>
+        </p:spPr>
+        <p:style>
+          <a:lnRef idx="1">
+            <a:schemeClr val="accent1"/>
+          </a:lnRef>
+          <a:fillRef idx="0">
+            <a:schemeClr val="accent1"/>
+          </a:fillRef>
+          <a:effectRef idx="0">
+            <a:schemeClr val="accent1"/>
+          </a:effectRef>
+          <a:fontRef idx="minor">
+            <a:schemeClr val="tx1"/>
+          </a:fontRef>
+        </p:style>
+      </p:cxnSp>
+      <p:cxnSp>
+        <p:nvCxnSpPr>
+          <p:cNvPr id="267" name="Straight Connector 266"/>
+          <p:cNvCxnSpPr/>
+          <p:nvPr/>
+        </p:nvCxnSpPr>
+        <p:spPr>
+          <a:xfrm flipV="1">
+            <a:off x="6019800" y="1111850"/>
+            <a:ext cx="0" cy="398249"/>
+          </a:xfrm>
+          <a:prstGeom prst="line">
+            <a:avLst/>
+          </a:prstGeom>
+        </p:spPr>
+        <p:style>
+          <a:lnRef idx="1">
+            <a:schemeClr val="accent1"/>
+          </a:lnRef>
+          <a:fillRef idx="0">
+            <a:schemeClr val="accent1"/>
+          </a:fillRef>
+          <a:effectRef idx="0">
+            <a:schemeClr val="accent1"/>
+          </a:effectRef>
+          <a:fontRef idx="minor">
+            <a:schemeClr val="tx1"/>
+          </a:fontRef>
+        </p:style>
+      </p:cxnSp>
+      <p:cxnSp>
+        <p:nvCxnSpPr>
+          <p:cNvPr id="270" name="Straight Connector 269"/>
+          <p:cNvCxnSpPr/>
+          <p:nvPr/>
+        </p:nvCxnSpPr>
+        <p:spPr>
+          <a:xfrm flipH="1">
+            <a:off x="1817400" y="1111850"/>
+            <a:ext cx="4202400" cy="0"/>
+          </a:xfrm>
+          <a:prstGeom prst="line">
+            <a:avLst/>
+          </a:prstGeom>
+        </p:spPr>
+        <p:style>
+          <a:lnRef idx="1">
+            <a:schemeClr val="accent1"/>
+          </a:lnRef>
+          <a:fillRef idx="0">
+            <a:schemeClr val="accent1"/>
+          </a:fillRef>
+          <a:effectRef idx="0">
+            <a:schemeClr val="accent1"/>
+          </a:effectRef>
+          <a:fontRef idx="minor">
+            <a:schemeClr val="tx1"/>
+          </a:fontRef>
+        </p:style>
+      </p:cxnSp>
+      <p:cxnSp>
+        <p:nvCxnSpPr>
+          <p:cNvPr id="273" name="Straight Arrow Connector 272"/>
+          <p:cNvCxnSpPr/>
+          <p:nvPr/>
+        </p:nvCxnSpPr>
+        <p:spPr>
+          <a:xfrm flipV="1">
+            <a:off x="1817400" y="990600"/>
+            <a:ext cx="0" cy="121250"/>
           </a:xfrm>
           <a:prstGeom prst="straightConnector1">
             <a:avLst/>

</xml_diff>